<commit_message>
More updates to the worksheet, slides
Signed-off-by: Robert Young <rwy0717@gmail.com>
</commit_message>
<xml_diff>
--- a/slides.pptx
+++ b/slides.pptx
@@ -2962,10 +2962,7 @@
           <a:bodyPr/>
           <a:lstStyle/>
           <a:p>
-            <a:r>
-              <a:rPr lang="en-US" dirty="0"/>
-              <a:t>Compacting (1/4)</a:t>
-            </a:r>
+            <a:endParaRPr lang="en-US" dirty="0"/>
           </a:p>
         </p:txBody>
       </p:sp>
@@ -2986,7 +2983,7 @@
           <a:p>
             <a:fld id="{6989B0B5-18C0-414E-B4A4-1EF2E8627D0C}" type="slidenum">
               <a:rPr lang="en-US" smtClean="0"/>
-              <a:t>41</a:t>
+              <a:t>39</a:t>
             </a:fld>
             <a:endParaRPr lang="en-US"/>
           </a:p>
@@ -2995,7 +2992,7 @@
     </p:spTree>
     <p:extLst>
       <p:ext uri="{BB962C8B-B14F-4D97-AF65-F5344CB8AC3E}">
-        <p14:creationId xmlns:p14="http://schemas.microsoft.com/office/powerpoint/2010/main" val="344098067"/>
+        <p14:creationId xmlns:p14="http://schemas.microsoft.com/office/powerpoint/2010/main" val="3460712583"/>
       </p:ext>
     </p:extLst>
   </p:cSld>
@@ -3049,30 +3046,10 @@
           <a:bodyPr/>
           <a:lstStyle/>
           <a:p>
-            <a:pPr marL="0" marR="0" lvl="0" indent="0" algn="l" defTabSz="914400" rtl="0" eaLnBrk="1" fontAlgn="auto" latinLnBrk="0" hangingPunct="1">
-              <a:lnSpc>
-                <a:spcPct val="100000"/>
-              </a:lnSpc>
-              <a:spcBef>
-                <a:spcPts val="0"/>
-              </a:spcBef>
-              <a:spcAft>
-                <a:spcPts val="0"/>
-              </a:spcAft>
-              <a:buClrTx/>
-              <a:buSzTx/>
-              <a:buFontTx/>
-              <a:buNone/>
-              <a:tabLst/>
-              <a:defRPr/>
-            </a:pPr>
             <a:r>
               <a:rPr lang="en-US" dirty="0"/>
-              <a:t>Compacting (2/4)</a:t>
-            </a:r>
-          </a:p>
-          <a:p>
-            <a:endParaRPr lang="en-US" dirty="0"/>
+              <a:t>Compacting (1/4)</a:t>
+            </a:r>
           </a:p>
         </p:txBody>
       </p:sp>
@@ -3093,7 +3070,7 @@
           <a:p>
             <a:fld id="{6989B0B5-18C0-414E-B4A4-1EF2E8627D0C}" type="slidenum">
               <a:rPr lang="en-US" smtClean="0"/>
-              <a:t>42</a:t>
+              <a:t>41</a:t>
             </a:fld>
             <a:endParaRPr lang="en-US"/>
           </a:p>
@@ -3102,7 +3079,7 @@
     </p:spTree>
     <p:extLst>
       <p:ext uri="{BB962C8B-B14F-4D97-AF65-F5344CB8AC3E}">
-        <p14:creationId xmlns:p14="http://schemas.microsoft.com/office/powerpoint/2010/main" val="476543157"/>
+        <p14:creationId xmlns:p14="http://schemas.microsoft.com/office/powerpoint/2010/main" val="344098067"/>
       </p:ext>
     </p:extLst>
   </p:cSld>
@@ -3175,7 +3152,7 @@
             </a:pPr>
             <a:r>
               <a:rPr lang="en-US" dirty="0"/>
-              <a:t>Compacting (3/4)</a:t>
+              <a:t>Compacting (2/4)</a:t>
             </a:r>
           </a:p>
           <a:p>
@@ -3200,7 +3177,7 @@
           <a:p>
             <a:fld id="{6989B0B5-18C0-414E-B4A4-1EF2E8627D0C}" type="slidenum">
               <a:rPr lang="en-US" smtClean="0"/>
-              <a:t>43</a:t>
+              <a:t>42</a:t>
             </a:fld>
             <a:endParaRPr lang="en-US"/>
           </a:p>
@@ -3209,7 +3186,7 @@
     </p:spTree>
     <p:extLst>
       <p:ext uri="{BB962C8B-B14F-4D97-AF65-F5344CB8AC3E}">
-        <p14:creationId xmlns:p14="http://schemas.microsoft.com/office/powerpoint/2010/main" val="2283474910"/>
+        <p14:creationId xmlns:p14="http://schemas.microsoft.com/office/powerpoint/2010/main" val="476543157"/>
       </p:ext>
     </p:extLst>
   </p:cSld>
@@ -3281,13 +3258,12 @@
               <a:defRPr/>
             </a:pPr>
             <a:r>
-              <a:rPr lang="en-US" dirty="0" err="1"/>
-              <a:t>Aaand</a:t>
-            </a:r>
-            <a:r>
               <a:rPr lang="en-US" dirty="0"/>
-              <a:t> the rest--compacting (4/4)</a:t>
-            </a:r>
+              <a:t>Compacting (3/4)</a:t>
+            </a:r>
+          </a:p>
+          <a:p>
+            <a:endParaRPr lang="en-US" dirty="0"/>
           </a:p>
         </p:txBody>
       </p:sp>
@@ -3308,7 +3284,7 @@
           <a:p>
             <a:fld id="{6989B0B5-18C0-414E-B4A4-1EF2E8627D0C}" type="slidenum">
               <a:rPr lang="en-US" smtClean="0"/>
-              <a:t>44</a:t>
+              <a:t>43</a:t>
             </a:fld>
             <a:endParaRPr lang="en-US"/>
           </a:p>
@@ -3317,7 +3293,7 @@
     </p:spTree>
     <p:extLst>
       <p:ext uri="{BB962C8B-B14F-4D97-AF65-F5344CB8AC3E}">
-        <p14:creationId xmlns:p14="http://schemas.microsoft.com/office/powerpoint/2010/main" val="1658938426"/>
+        <p14:creationId xmlns:p14="http://schemas.microsoft.com/office/powerpoint/2010/main" val="2283474910"/>
       </p:ext>
     </p:extLst>
   </p:cSld>
@@ -3371,6 +3347,114 @@
           <a:bodyPr/>
           <a:lstStyle/>
           <a:p>
+            <a:pPr marL="0" marR="0" lvl="0" indent="0" algn="l" defTabSz="914400" rtl="0" eaLnBrk="1" fontAlgn="auto" latinLnBrk="0" hangingPunct="1">
+              <a:lnSpc>
+                <a:spcPct val="100000"/>
+              </a:lnSpc>
+              <a:spcBef>
+                <a:spcPts val="0"/>
+              </a:spcBef>
+              <a:spcAft>
+                <a:spcPts val="0"/>
+              </a:spcAft>
+              <a:buClrTx/>
+              <a:buSzTx/>
+              <a:buFontTx/>
+              <a:buNone/>
+              <a:tabLst/>
+              <a:defRPr/>
+            </a:pPr>
+            <a:r>
+              <a:rPr lang="en-US" dirty="0" err="1"/>
+              <a:t>Aaand</a:t>
+            </a:r>
+            <a:r>
+              <a:rPr lang="en-US" dirty="0"/>
+              <a:t> the rest--compacting (4/4)</a:t>
+            </a:r>
+          </a:p>
+        </p:txBody>
+      </p:sp>
+      <p:sp>
+        <p:nvSpPr>
+          <p:cNvPr id="4" name="Slide Number Placeholder 3"/>
+          <p:cNvSpPr>
+            <a:spLocks noGrp="1"/>
+          </p:cNvSpPr>
+          <p:nvPr>
+            <p:ph type="sldNum" sz="quarter" idx="5"/>
+          </p:nvPr>
+        </p:nvSpPr>
+        <p:spPr/>
+        <p:txBody>
+          <a:bodyPr/>
+          <a:lstStyle/>
+          <a:p>
+            <a:fld id="{6989B0B5-18C0-414E-B4A4-1EF2E8627D0C}" type="slidenum">
+              <a:rPr lang="en-US" smtClean="0"/>
+              <a:t>44</a:t>
+            </a:fld>
+            <a:endParaRPr lang="en-US"/>
+          </a:p>
+        </p:txBody>
+      </p:sp>
+    </p:spTree>
+    <p:extLst>
+      <p:ext uri="{BB962C8B-B14F-4D97-AF65-F5344CB8AC3E}">
+        <p14:creationId xmlns:p14="http://schemas.microsoft.com/office/powerpoint/2010/main" val="1658938426"/>
+      </p:ext>
+    </p:extLst>
+  </p:cSld>
+  <p:clrMapOvr>
+    <a:masterClrMapping/>
+  </p:clrMapOvr>
+</p:notes>
+</file>
+
+<file path=ppt/notesSlides/notesSlide36.xml><?xml version="1.0" encoding="utf-8"?>
+<p:notes xmlns:a="http://schemas.openxmlformats.org/drawingml/2006/main" xmlns:r="http://schemas.openxmlformats.org/officeDocument/2006/relationships" xmlns:p="http://schemas.openxmlformats.org/presentationml/2006/main">
+  <p:cSld>
+    <p:spTree>
+      <p:nvGrpSpPr>
+        <p:cNvPr id="1" name=""/>
+        <p:cNvGrpSpPr/>
+        <p:nvPr/>
+      </p:nvGrpSpPr>
+      <p:grpSpPr>
+        <a:xfrm>
+          <a:off x="0" y="0"/>
+          <a:ext cx="0" cy="0"/>
+          <a:chOff x="0" y="0"/>
+          <a:chExt cx="0" cy="0"/>
+        </a:xfrm>
+      </p:grpSpPr>
+      <p:sp>
+        <p:nvSpPr>
+          <p:cNvPr id="2" name="Slide Image Placeholder 1"/>
+          <p:cNvSpPr>
+            <a:spLocks noGrp="1" noRot="1" noChangeAspect="1"/>
+          </p:cNvSpPr>
+          <p:nvPr>
+            <p:ph type="sldImg"/>
+          </p:nvPr>
+        </p:nvSpPr>
+        <p:spPr/>
+      </p:sp>
+      <p:sp>
+        <p:nvSpPr>
+          <p:cNvPr id="3" name="Notes Placeholder 2"/>
+          <p:cNvSpPr>
+            <a:spLocks noGrp="1"/>
+          </p:cNvSpPr>
+          <p:nvPr>
+            <p:ph type="body" idx="1"/>
+          </p:nvPr>
+        </p:nvSpPr>
+        <p:spPr/>
+        <p:txBody>
+          <a:bodyPr/>
+          <a:lstStyle/>
+          <a:p>
             <a:endParaRPr lang="en-US" dirty="0"/>
           </a:p>
         </p:txBody>
@@ -3411,7 +3495,7 @@
 </p:notes>
 </file>
 
-<file path=ppt/notesSlides/notesSlide36.xml><?xml version="1.0" encoding="utf-8"?>
+<file path=ppt/notesSlides/notesSlide37.xml><?xml version="1.0" encoding="utf-8"?>
 <p:notes xmlns:a="http://schemas.openxmlformats.org/drawingml/2006/main" xmlns:r="http://schemas.openxmlformats.org/officeDocument/2006/relationships" xmlns:p="http://schemas.openxmlformats.org/presentationml/2006/main">
   <p:cSld>
     <p:spTree>
@@ -47152,7 +47236,7 @@
               <a:rPr lang="en-US" dirty="0">
                 <a:latin typeface="Consolas" panose="020B0609020204030204" pitchFamily="49" charset="0"/>
               </a:rPr>
-              <a:t>OMR::GC::System system(runtime, config);</a:t>
+              <a:t>OMR::GC::System system(runtime);</a:t>
             </a:r>
           </a:p>
           <a:p>
@@ -47172,7 +47256,15 @@
           <a:p>
             <a:r>
               <a:rPr lang="en-US" dirty="0"/>
-              <a:t>GC::Context cx(sys);</a:t>
+              <a:t>OMR::GC::Context </a:t>
+            </a:r>
+            <a:r>
+              <a:rPr lang="en-US" dirty="0" err="1"/>
+              <a:t>ctx</a:t>
+            </a:r>
+            <a:r>
+              <a:rPr lang="en-US" dirty="0"/>
+              <a:t>(system);</a:t>
             </a:r>
           </a:p>
         </p:txBody>
@@ -49077,19 +49169,40 @@
           <a:p>
             <a:r>
               <a:rPr lang="en-US" dirty="0"/>
-              <a:t>Fragmentation is bad</a:t>
-            </a:r>
-          </a:p>
-          <a:p>
+              <a:t>Heap fragmentation is bad for the application</a:t>
+            </a:r>
+          </a:p>
+          <a:p>
+            <a:pPr lvl="1"/>
             <a:r>
               <a:rPr lang="en-US" dirty="0"/>
-              <a:t>The collector can slide left compaction</a:t>
-            </a:r>
-          </a:p>
-          <a:p>
+              <a:t>Slow allocation</a:t>
+            </a:r>
+          </a:p>
+          <a:p>
+            <a:pPr lvl="1"/>
             <a:r>
               <a:rPr lang="en-US" dirty="0"/>
-              <a:t>Eliminates heap fragmentation</a:t>
+              <a:t>Bad data locality</a:t>
+            </a:r>
+          </a:p>
+          <a:p>
+            <a:pPr lvl="1"/>
+            <a:r>
+              <a:rPr lang="en-US" dirty="0"/>
+              <a:t>Unusable heap memory</a:t>
+            </a:r>
+          </a:p>
+          <a:p>
+            <a:r>
+              <a:rPr lang="en-US" dirty="0"/>
+              <a:t>The collector can slide all live objects together</a:t>
+            </a:r>
+          </a:p>
+          <a:p>
+            <a:r>
+              <a:rPr lang="en-US" dirty="0"/>
+              <a:t>Groups heap into live, and free regions</a:t>
             </a:r>
           </a:p>
           <a:p>

</xml_diff>